<commit_message>
Changed Steven to Steve
</commit_message>
<xml_diff>
--- a/PC Repair Clinic Inventory System.pptx
+++ b/PC Repair Clinic Inventory System.pptx
@@ -5023,7 +5023,11 @@
           <a:p>
             <a:r>
               <a:rPr lang="en-US" sz="3600" dirty="0" smtClean="0"/>
-              <a:t>Steven Golden</a:t>
+              <a:t>Steve </a:t>
+            </a:r>
+            <a:r>
+              <a:rPr lang="en-US" sz="3600" dirty="0" smtClean="0"/>
+              <a:t>Golden</a:t>
             </a:r>
           </a:p>
           <a:p>
@@ -5370,15 +5374,7 @@
           <a:p>
             <a:r>
               <a:rPr lang="en-US" sz="3600" dirty="0" smtClean="0"/>
-              <a:t>Will be </a:t>
-            </a:r>
-            <a:r>
-              <a:rPr lang="en-US" sz="3600" dirty="0" smtClean="0"/>
-              <a:t>utilized </a:t>
-            </a:r>
-            <a:r>
-              <a:rPr lang="en-US" sz="3600" dirty="0" smtClean="0"/>
-              <a:t>on both </a:t>
+              <a:t>Will be utilized on both </a:t>
             </a:r>
             <a:r>
               <a:rPr lang="en-US" sz="3600" dirty="0" err="1" smtClean="0"/>
@@ -5501,11 +5497,7 @@
             <a:pPr lvl="1"/>
             <a:r>
               <a:rPr lang="en-US" sz="3500" dirty="0" smtClean="0"/>
-              <a:t>Web-based </a:t>
-            </a:r>
-            <a:r>
-              <a:rPr lang="en-US" sz="3500" dirty="0" smtClean="0"/>
-              <a:t>app</a:t>
+              <a:t>Web-based app</a:t>
             </a:r>
           </a:p>
           <a:p>
@@ -5608,11 +5600,7 @@
             <a:pPr lvl="1"/>
             <a:r>
               <a:rPr lang="en-US" sz="3500" dirty="0" smtClean="0"/>
-              <a:t>QR </a:t>
-            </a:r>
-            <a:r>
-              <a:rPr lang="en-US" sz="3500" dirty="0" smtClean="0"/>
-              <a:t>Codes and scanners</a:t>
+              <a:t>QR Codes and scanners</a:t>
             </a:r>
           </a:p>
           <a:p>
@@ -5698,21 +5686,13 @@
             <a:pPr lvl="1"/>
             <a:r>
               <a:rPr lang="en-US" sz="3600" dirty="0" smtClean="0"/>
-              <a:t>MySQL </a:t>
-            </a:r>
-            <a:r>
-              <a:rPr lang="en-US" sz="3600" dirty="0" smtClean="0"/>
-              <a:t>v 5.5.59</a:t>
+              <a:t>MySQL v 5.5.59</a:t>
             </a:r>
           </a:p>
           <a:p>
             <a:r>
               <a:rPr lang="en-US" sz="4000" dirty="0" smtClean="0"/>
-              <a:t>JavaScript </a:t>
-            </a:r>
-            <a:r>
-              <a:rPr lang="en-US" sz="4000" dirty="0" smtClean="0"/>
-              <a:t>barcode generator</a:t>
+              <a:t>JavaScript barcode generator</a:t>
             </a:r>
           </a:p>
           <a:p>

</xml_diff>

<commit_message>
Changed stuff as described via meeting
</commit_message>
<xml_diff>
--- a/PC Repair Clinic Inventory System.pptx
+++ b/PC Repair Clinic Inventory System.pptx
@@ -16,8 +16,8 @@
     <p:sldId id="276" r:id="rId5"/>
     <p:sldId id="277" r:id="rId6"/>
     <p:sldId id="278" r:id="rId7"/>
-    <p:sldId id="279" r:id="rId8"/>
-    <p:sldId id="280" r:id="rId9"/>
+    <p:sldId id="280" r:id="rId8"/>
+    <p:sldId id="279" r:id="rId9"/>
     <p:sldId id="282" r:id="rId10"/>
     <p:sldId id="272" r:id="rId11"/>
   </p:sldIdLst>
@@ -5004,7 +5004,7 @@
           <a:p>
             <a:r>
               <a:rPr lang="en-US" sz="3600" dirty="0"/>
-              <a:t>Steve Golden</a:t>
+              <a:t>Steven Golden</a:t>
             </a:r>
           </a:p>
           <a:p>
@@ -5121,13 +5121,13 @@
           <a:p>
             <a:r>
               <a:rPr lang="en-US" sz="3600" dirty="0"/>
-              <a:t>Adam – Database Management</a:t>
+              <a:t>Adam – Team Leader and Database Management</a:t>
             </a:r>
           </a:p>
           <a:p>
             <a:r>
               <a:rPr lang="en-US" sz="3600" dirty="0"/>
-              <a:t>Steve – Backend/PHP</a:t>
+              <a:t>Steven – Backend/PHP</a:t>
             </a:r>
           </a:p>
           <a:p>
@@ -5233,8 +5233,9 @@
           <a:p>
             <a:r>
               <a:rPr lang="en-US" sz="3600" dirty="0"/>
-              <a:t>PC Repair Clinic on campus</a:t>
-            </a:r>
+              <a:t>PC Repair Clinic on campus.</a:t>
+            </a:r>
+            <a:endParaRPr lang="en-US" sz="3500" dirty="0"/>
           </a:p>
           <a:p>
             <a:r>
@@ -5315,9 +5316,44 @@
           <a:chExt cx="0" cy="0"/>
         </a:xfrm>
       </p:grpSpPr>
+      <p:sp>
+        <p:nvSpPr>
+          <p:cNvPr id="4" name="Title 3"/>
+          <p:cNvSpPr>
+            <a:spLocks noGrp="1"/>
+          </p:cNvSpPr>
+          <p:nvPr>
+            <p:ph type="title"/>
+          </p:nvPr>
+        </p:nvSpPr>
+        <p:spPr>
+          <a:xfrm>
+            <a:off x="508000" y="694113"/>
+            <a:ext cx="10972800" cy="1066800"/>
+          </a:xfrm>
+        </p:spPr>
+        <p:txBody>
+          <a:bodyPr>
+            <a:noAutofit/>
+          </a:bodyPr>
+          <a:lstStyle/>
+          <a:p>
+            <a:r>
+              <a:rPr lang="en-US" sz="8000" dirty="0"/>
+              <a:t>The Old System</a:t>
+            </a:r>
+          </a:p>
+        </p:txBody>
+      </p:sp>
       <p:pic>
         <p:nvPicPr>
-          <p:cNvPr id="5" name="Content Placeholder 4"/>
+          <p:cNvPr id="9" name="Content Placeholder 8">
+            <a:extLst>
+              <a:ext uri="{FF2B5EF4-FFF2-40B4-BE49-F238E27FC236}">
+                <a16:creationId xmlns:a16="http://schemas.microsoft.com/office/drawing/2014/main" id="{CAF4EE89-6070-47F8-AB41-2AC84D37EE42}"/>
+              </a:ext>
+            </a:extLst>
+          </p:cNvPr>
           <p:cNvPicPr>
             <a:picLocks noGrp="1" noChangeAspect="1"/>
           </p:cNvPicPr>
@@ -5333,43 +5369,14 @@
         </p:blipFill>
         <p:spPr>
           <a:xfrm>
-            <a:off x="648393" y="1905517"/>
-            <a:ext cx="10650190" cy="4182462"/>
+            <a:off x="260658" y="1978429"/>
+            <a:ext cx="11670684" cy="3441469"/>
           </a:xfrm>
           <a:prstGeom prst="rect">
             <a:avLst/>
           </a:prstGeom>
         </p:spPr>
       </p:pic>
-      <p:sp>
-        <p:nvSpPr>
-          <p:cNvPr id="4" name="Title 3"/>
-          <p:cNvSpPr>
-            <a:spLocks noGrp="1"/>
-          </p:cNvSpPr>
-          <p:nvPr>
-            <p:ph type="title"/>
-          </p:nvPr>
-        </p:nvSpPr>
-        <p:spPr>
-          <a:xfrm>
-            <a:off x="508000" y="694113"/>
-            <a:ext cx="10972800" cy="1066800"/>
-          </a:xfrm>
-        </p:spPr>
-        <p:txBody>
-          <a:bodyPr>
-            <a:noAutofit/>
-          </a:bodyPr>
-          <a:lstStyle/>
-          <a:p>
-            <a:r>
-              <a:rPr lang="en-US" sz="8000" dirty="0"/>
-              <a:t>The Old System</a:t>
-            </a:r>
-          </a:p>
-        </p:txBody>
-      </p:sp>
     </p:spTree>
     <p:extLst>
       <p:ext uri="{BB962C8B-B14F-4D97-AF65-F5344CB8AC3E}">
@@ -5465,6 +5472,12 @@
               <a:t> and Chrome.</a:t>
             </a:r>
           </a:p>
+          <a:p>
+            <a:r>
+              <a:rPr lang="en-US" sz="3600" dirty="0"/>
+              <a:t>Utilizing barcode scanners.</a:t>
+            </a:r>
+          </a:p>
         </p:txBody>
       </p:sp>
       <p:sp>
@@ -5540,64 +5553,83 @@
       </p:grpSpPr>
       <p:sp>
         <p:nvSpPr>
-          <p:cNvPr id="3" name="Content Placeholder 2"/>
-          <p:cNvSpPr>
-            <a:spLocks noGrp="1"/>
-          </p:cNvSpPr>
-          <p:nvPr>
-            <p:ph sz="half" idx="1"/>
-          </p:nvPr>
-        </p:nvSpPr>
-        <p:spPr>
-          <a:xfrm>
-            <a:off x="609599" y="1760913"/>
-            <a:ext cx="5367253" cy="4830387"/>
+          <p:cNvPr id="2" name="Content Placeholder 1"/>
+          <p:cNvSpPr>
+            <a:spLocks noGrp="1"/>
+          </p:cNvSpPr>
+          <p:nvPr>
+            <p:ph sz="half" idx="2"/>
+          </p:nvPr>
+        </p:nvSpPr>
+        <p:spPr>
+          <a:xfrm>
+            <a:off x="609600" y="1861457"/>
+            <a:ext cx="10871200" cy="4669971"/>
           </a:xfrm>
         </p:spPr>
         <p:txBody>
           <a:bodyPr>
-            <a:normAutofit/>
+            <a:normAutofit lnSpcReduction="10000"/>
           </a:bodyPr>
           <a:lstStyle/>
           <a:p>
             <a:r>
+              <a:rPr lang="en-US" sz="4000" dirty="0"/>
+              <a:t>HTML, CSS, JavaScript, PHP and MySQL.</a:t>
+            </a:r>
+          </a:p>
+          <a:p>
+            <a:pPr lvl="1"/>
+            <a:r>
               <a:rPr lang="en-US" sz="3600" dirty="0"/>
-              <a:t>In Scope:</a:t>
+              <a:t>MySQL v 5.5.59</a:t>
+            </a:r>
+          </a:p>
+          <a:p>
+            <a:r>
+              <a:rPr lang="en-US" sz="4000" dirty="0"/>
+              <a:t>JavaScript barcode generator</a:t>
             </a:r>
           </a:p>
           <a:p>
             <a:pPr lvl="1"/>
             <a:r>
-              <a:rPr lang="en-US" sz="3500" dirty="0"/>
-              <a:t>Barcode generation</a:t>
+              <a:rPr lang="en-US" sz="3600" dirty="0">
+                <a:hlinkClick r:id="rId2"/>
+              </a:rPr>
+              <a:t>http://lindell.me/JsBarcode/</a:t>
+            </a:r>
+            <a:endParaRPr lang="en-US" sz="3600" dirty="0"/>
+          </a:p>
+          <a:p>
+            <a:r>
+              <a:rPr lang="en-US" sz="3700" dirty="0"/>
+              <a:t>Materialize CSS</a:t>
             </a:r>
           </a:p>
           <a:p>
             <a:pPr lvl="1"/>
             <a:r>
-              <a:rPr lang="en-US" sz="3500" dirty="0"/>
+              <a:rPr lang="en-US" sz="3600" dirty="0">
+                <a:hlinkClick r:id="rId3"/>
+              </a:rPr>
+              <a:t>http://materializecss.com/</a:t>
+            </a:r>
+            <a:r>
+              <a:rPr lang="en-US" sz="3600" dirty="0"/>
+              <a:t> </a:t>
+            </a:r>
+          </a:p>
+          <a:p>
+            <a:r>
+              <a:rPr lang="en-US" sz="4000" dirty="0"/>
+              <a:t>Working on an Ubuntu server (14.04.3 LTS)</a:t>
+            </a:r>
+          </a:p>
+          <a:p>
+            <a:r>
+              <a:rPr lang="en-US" sz="4000" dirty="0"/>
               <a:t>Barcode scanners</a:t>
-            </a:r>
-          </a:p>
-          <a:p>
-            <a:pPr lvl="1"/>
-            <a:r>
-              <a:rPr lang="en-US" sz="3500" dirty="0"/>
-              <a:t>Barcode printing</a:t>
-            </a:r>
-          </a:p>
-          <a:p>
-            <a:pPr lvl="1"/>
-            <a:r>
-              <a:rPr lang="en-US" sz="3500" dirty="0"/>
-              <a:t>Creation of MySQL database</a:t>
-            </a:r>
-          </a:p>
-          <a:p>
-            <a:pPr lvl="1"/>
-            <a:r>
-              <a:rPr lang="en-US" sz="3500" dirty="0"/>
-              <a:t>Admin login page</a:t>
             </a:r>
           </a:p>
         </p:txBody>
@@ -5626,57 +5658,7 @@
           <a:p>
             <a:r>
               <a:rPr lang="en-US" sz="8000" dirty="0"/>
-              <a:t>Scope</a:t>
-            </a:r>
-          </a:p>
-        </p:txBody>
-      </p:sp>
-      <p:sp>
-        <p:nvSpPr>
-          <p:cNvPr id="5" name="Content Placeholder 2"/>
-          <p:cNvSpPr>
-            <a:spLocks noGrp="1"/>
-          </p:cNvSpPr>
-          <p:nvPr>
-            <p:ph sz="half" idx="1"/>
-          </p:nvPr>
-        </p:nvSpPr>
-        <p:spPr>
-          <a:xfrm>
-            <a:off x="6215149" y="1760913"/>
-            <a:ext cx="5384800" cy="4830387"/>
-          </a:xfrm>
-        </p:spPr>
-        <p:txBody>
-          <a:bodyPr>
-            <a:normAutofit/>
-          </a:bodyPr>
-          <a:lstStyle/>
-          <a:p>
-            <a:r>
-              <a:rPr lang="en-US" sz="3600" dirty="0"/>
-              <a:t>Out of Scope:</a:t>
-            </a:r>
-          </a:p>
-          <a:p>
-            <a:pPr lvl="1"/>
-            <a:r>
-              <a:rPr lang="en-US" sz="3500" dirty="0"/>
-              <a:t>Invoicing</a:t>
-            </a:r>
-          </a:p>
-          <a:p>
-            <a:pPr lvl="1"/>
-            <a:r>
-              <a:rPr lang="en-US" sz="3500" dirty="0"/>
-              <a:t>QR Codes and scanners</a:t>
-            </a:r>
-          </a:p>
-          <a:p>
-            <a:pPr lvl="1"/>
-            <a:r>
-              <a:rPr lang="en-US" sz="3500" dirty="0"/>
-              <a:t>Data load/conversion</a:t>
+              <a:t>Approach</a:t>
             </a:r>
           </a:p>
         </p:txBody>
@@ -5684,7 +5666,7 @@
     </p:spTree>
     <p:extLst>
       <p:ext uri="{BB962C8B-B14F-4D97-AF65-F5344CB8AC3E}">
-        <p14:creationId xmlns:p14="http://schemas.microsoft.com/office/powerpoint/2010/main" val="2293871604"/>
+        <p14:creationId xmlns:p14="http://schemas.microsoft.com/office/powerpoint/2010/main" val="4158384473"/>
       </p:ext>
     </p:extLst>
   </p:cSld>
@@ -5725,83 +5707,64 @@
       </p:grpSpPr>
       <p:sp>
         <p:nvSpPr>
-          <p:cNvPr id="2" name="Content Placeholder 1"/>
-          <p:cNvSpPr>
-            <a:spLocks noGrp="1"/>
-          </p:cNvSpPr>
-          <p:nvPr>
-            <p:ph sz="half" idx="2"/>
-          </p:nvPr>
-        </p:nvSpPr>
-        <p:spPr>
-          <a:xfrm>
-            <a:off x="609600" y="1861457"/>
-            <a:ext cx="10871200" cy="4669971"/>
+          <p:cNvPr id="3" name="Content Placeholder 2"/>
+          <p:cNvSpPr>
+            <a:spLocks noGrp="1"/>
+          </p:cNvSpPr>
+          <p:nvPr>
+            <p:ph sz="half" idx="1"/>
+          </p:nvPr>
+        </p:nvSpPr>
+        <p:spPr>
+          <a:xfrm>
+            <a:off x="609599" y="1760913"/>
+            <a:ext cx="5367253" cy="4830387"/>
           </a:xfrm>
         </p:spPr>
         <p:txBody>
           <a:bodyPr>
-            <a:normAutofit lnSpcReduction="10000"/>
+            <a:normAutofit/>
           </a:bodyPr>
           <a:lstStyle/>
           <a:p>
             <a:r>
-              <a:rPr lang="en-US" sz="4000" dirty="0"/>
-              <a:t>HTML, CSS, JavaScript, PHP and MySQL.</a:t>
+              <a:rPr lang="en-US" sz="3600" dirty="0"/>
+              <a:t>In Scope:</a:t>
             </a:r>
           </a:p>
           <a:p>
             <a:pPr lvl="1"/>
             <a:r>
-              <a:rPr lang="en-US" sz="3600" dirty="0"/>
-              <a:t>MySQL v 5.5.59</a:t>
-            </a:r>
-          </a:p>
-          <a:p>
-            <a:r>
-              <a:rPr lang="en-US" sz="4000" dirty="0"/>
-              <a:t>JavaScript barcode generator</a:t>
+              <a:rPr lang="en-US" sz="3500" dirty="0"/>
+              <a:t>Creation of MySQL database</a:t>
             </a:r>
           </a:p>
           <a:p>
             <a:pPr lvl="1"/>
             <a:r>
-              <a:rPr lang="en-US" sz="3600" dirty="0">
-                <a:hlinkClick r:id="rId2"/>
-              </a:rPr>
-              <a:t>http://lindell.me/JsBarcode/</a:t>
-            </a:r>
-            <a:endParaRPr lang="en-US" sz="3600" dirty="0"/>
-          </a:p>
-          <a:p>
-            <a:r>
-              <a:rPr lang="en-US" sz="3700" dirty="0"/>
-              <a:t>Materialize CSS</a:t>
+              <a:rPr lang="en-US" sz="3500" dirty="0"/>
+              <a:t>Barcode generation</a:t>
             </a:r>
           </a:p>
           <a:p>
             <a:pPr lvl="1"/>
             <a:r>
-              <a:rPr lang="en-US" sz="3600" dirty="0">
-                <a:hlinkClick r:id="rId3"/>
-              </a:rPr>
-              <a:t>http://materializecss.com/</a:t>
-            </a:r>
-            <a:r>
-              <a:rPr lang="en-US" sz="3600" dirty="0"/>
-              <a:t> </a:t>
-            </a:r>
-          </a:p>
-          <a:p>
-            <a:r>
-              <a:rPr lang="en-US" sz="4000" dirty="0"/>
-              <a:t>Working on an Ubuntu server (14.04.3 LTS)</a:t>
-            </a:r>
-          </a:p>
-          <a:p>
-            <a:r>
-              <a:rPr lang="en-US" sz="4000" dirty="0"/>
+              <a:rPr lang="en-US" sz="3500" dirty="0"/>
               <a:t>Barcode scanners</a:t>
+            </a:r>
+          </a:p>
+          <a:p>
+            <a:pPr lvl="1"/>
+            <a:r>
+              <a:rPr lang="en-US" sz="3500" dirty="0"/>
+              <a:t>Barcode printing</a:t>
+            </a:r>
+          </a:p>
+          <a:p>
+            <a:pPr lvl="1"/>
+            <a:r>
+              <a:rPr lang="en-US" sz="3500" dirty="0"/>
+              <a:t>Admin login page/backend page</a:t>
             </a:r>
           </a:p>
         </p:txBody>
@@ -5830,7 +5793,57 @@
           <a:p>
             <a:r>
               <a:rPr lang="en-US" sz="8000" dirty="0"/>
-              <a:t>Approach</a:t>
+              <a:t>Scope</a:t>
+            </a:r>
+          </a:p>
+        </p:txBody>
+      </p:sp>
+      <p:sp>
+        <p:nvSpPr>
+          <p:cNvPr id="5" name="Content Placeholder 2"/>
+          <p:cNvSpPr>
+            <a:spLocks noGrp="1"/>
+          </p:cNvSpPr>
+          <p:nvPr>
+            <p:ph sz="half" idx="1"/>
+          </p:nvPr>
+        </p:nvSpPr>
+        <p:spPr>
+          <a:xfrm>
+            <a:off x="6215149" y="1760913"/>
+            <a:ext cx="5384800" cy="4830387"/>
+          </a:xfrm>
+        </p:spPr>
+        <p:txBody>
+          <a:bodyPr>
+            <a:normAutofit/>
+          </a:bodyPr>
+          <a:lstStyle/>
+          <a:p>
+            <a:r>
+              <a:rPr lang="en-US" sz="3600" dirty="0"/>
+              <a:t>Out of Scope:</a:t>
+            </a:r>
+          </a:p>
+          <a:p>
+            <a:pPr lvl="1"/>
+            <a:r>
+              <a:rPr lang="en-US" sz="3500" dirty="0"/>
+              <a:t>Invoicing</a:t>
+            </a:r>
+          </a:p>
+          <a:p>
+            <a:pPr lvl="1"/>
+            <a:r>
+              <a:rPr lang="en-US" sz="3500" dirty="0"/>
+              <a:t>QR Codes and scanners</a:t>
+            </a:r>
+          </a:p>
+          <a:p>
+            <a:pPr lvl="1"/>
+            <a:r>
+              <a:rPr lang="en-US" sz="3500" dirty="0"/>
+              <a:t>Data load/conversion</a:t>
             </a:r>
           </a:p>
         </p:txBody>
@@ -5838,7 +5851,7 @@
     </p:spTree>
     <p:extLst>
       <p:ext uri="{BB962C8B-B14F-4D97-AF65-F5344CB8AC3E}">
-        <p14:creationId xmlns:p14="http://schemas.microsoft.com/office/powerpoint/2010/main" val="4158384473"/>
+        <p14:creationId xmlns:p14="http://schemas.microsoft.com/office/powerpoint/2010/main" val="2293871604"/>
       </p:ext>
     </p:extLst>
   </p:cSld>
@@ -5887,7 +5900,12 @@
             <p:ph sz="half" idx="1"/>
           </p:nvPr>
         </p:nvSpPr>
-        <p:spPr/>
+        <p:spPr>
+          <a:xfrm>
+            <a:off x="609600" y="2249425"/>
+            <a:ext cx="10871200" cy="4341875"/>
+          </a:xfrm>
+        </p:spPr>
         <p:txBody>
           <a:bodyPr>
             <a:normAutofit/>
@@ -5896,7 +5914,7 @@
           <a:p>
             <a:r>
               <a:rPr lang="en-US" sz="3600" dirty="0"/>
-              <a:t>Collaborating via Zoom</a:t>
+              <a:t>Collaborating via Zoom and Skype</a:t>
             </a:r>
           </a:p>
           <a:p>

</xml_diff>

<commit_message>
Added Timeline placeholder slide
</commit_message>
<xml_diff>
--- a/PC Repair Clinic Inventory System.pptx
+++ b/PC Repair Clinic Inventory System.pptx
@@ -5,10 +5,10 @@
     <p:sldMasterId id="2147483684" r:id="rId2"/>
   </p:sldMasterIdLst>
   <p:notesMasterIdLst>
-    <p:notesMasterId r:id="rId12"/>
+    <p:notesMasterId r:id="rId13"/>
   </p:notesMasterIdLst>
   <p:handoutMasterIdLst>
-    <p:handoutMasterId r:id="rId13"/>
+    <p:handoutMasterId r:id="rId14"/>
   </p:handoutMasterIdLst>
   <p:sldIdLst>
     <p:sldId id="275" r:id="rId3"/>
@@ -18,8 +18,9 @@
     <p:sldId id="278" r:id="rId7"/>
     <p:sldId id="280" r:id="rId8"/>
     <p:sldId id="279" r:id="rId9"/>
-    <p:sldId id="282" r:id="rId10"/>
-    <p:sldId id="272" r:id="rId11"/>
+    <p:sldId id="285" r:id="rId10"/>
+    <p:sldId id="282" r:id="rId11"/>
+    <p:sldId id="272" r:id="rId12"/>
   </p:sldIdLst>
   <p:sldSz cx="12192000" cy="6858000"/>
   <p:notesSz cx="6858000" cy="9144000"/>
@@ -739,6 +740,145 @@
     <p:extLst>
       <p:ext uri="{BB962C8B-B14F-4D97-AF65-F5344CB8AC3E}">
         <p14:creationId xmlns:p14="http://schemas.microsoft.com/office/powerpoint/2010/main" val="1063280618"/>
+      </p:ext>
+    </p:extLst>
+  </p:cSld>
+  <p:clrMapOvr>
+    <a:masterClrMapping/>
+  </p:clrMapOvr>
+</p:notes>
+</file>
+
+<file path=ppt/notesSlides/notesSlide2.xml><?xml version="1.0" encoding="utf-8"?>
+<p:notes xmlns:a="http://schemas.openxmlformats.org/drawingml/2006/main" xmlns:r="http://schemas.openxmlformats.org/officeDocument/2006/relationships" xmlns:p="http://schemas.openxmlformats.org/presentationml/2006/main">
+  <p:cSld>
+    <p:spTree>
+      <p:nvGrpSpPr>
+        <p:cNvPr id="1" name=""/>
+        <p:cNvGrpSpPr/>
+        <p:nvPr/>
+      </p:nvGrpSpPr>
+      <p:grpSpPr>
+        <a:xfrm>
+          <a:off x="0" y="0"/>
+          <a:ext cx="0" cy="0"/>
+          <a:chOff x="0" y="0"/>
+          <a:chExt cx="0" cy="0"/>
+        </a:xfrm>
+      </p:grpSpPr>
+      <p:sp>
+        <p:nvSpPr>
+          <p:cNvPr id="2" name="Slide Image Placeholder 1"/>
+          <p:cNvSpPr>
+            <a:spLocks noGrp="1" noRot="1" noChangeAspect="1"/>
+          </p:cNvSpPr>
+          <p:nvPr>
+            <p:ph type="sldImg"/>
+          </p:nvPr>
+        </p:nvSpPr>
+        <p:spPr/>
+      </p:sp>
+      <p:sp>
+        <p:nvSpPr>
+          <p:cNvPr id="3" name="Notes Placeholder 2"/>
+          <p:cNvSpPr>
+            <a:spLocks noGrp="1"/>
+          </p:cNvSpPr>
+          <p:nvPr>
+            <p:ph type="body" idx="1"/>
+          </p:nvPr>
+        </p:nvSpPr>
+        <p:spPr/>
+        <p:txBody>
+          <a:bodyPr/>
+          <a:lstStyle/>
+          <a:p>
+            <a:pPr marL="0" marR="0" lvl="0" indent="0" algn="l" defTabSz="914400" rtl="0" eaLnBrk="1" fontAlgn="auto" latinLnBrk="0" hangingPunct="1">
+              <a:lnSpc>
+                <a:spcPct val="100000"/>
+              </a:lnSpc>
+              <a:spcBef>
+                <a:spcPts val="0"/>
+              </a:spcBef>
+              <a:spcAft>
+                <a:spcPts val="0"/>
+              </a:spcAft>
+              <a:buClrTx/>
+              <a:buSzTx/>
+              <a:buFontTx/>
+              <a:buNone/>
+              <a:tabLst/>
+              <a:defRPr/>
+            </a:pPr>
+            <a:r>
+              <a:rPr lang="en-US" sz="1200" dirty="0">
+                <a:hlinkClick r:id="rId3"/>
+              </a:rPr>
+              <a:t>http://materializecss.com/</a:t>
+            </a:r>
+            <a:r>
+              <a:rPr lang="en-US" sz="1200" dirty="0"/>
+              <a:t> </a:t>
+            </a:r>
+          </a:p>
+          <a:p>
+            <a:pPr marL="0" marR="0" lvl="0" indent="0" algn="l" defTabSz="914400" rtl="0" eaLnBrk="1" fontAlgn="auto" latinLnBrk="0" hangingPunct="1">
+              <a:lnSpc>
+                <a:spcPct val="100000"/>
+              </a:lnSpc>
+              <a:spcBef>
+                <a:spcPts val="0"/>
+              </a:spcBef>
+              <a:spcAft>
+                <a:spcPts val="0"/>
+              </a:spcAft>
+              <a:buClrTx/>
+              <a:buSzTx/>
+              <a:buFontTx/>
+              <a:buNone/>
+              <a:tabLst/>
+              <a:defRPr/>
+            </a:pPr>
+            <a:r>
+              <a:rPr lang="en-US" sz="1200" dirty="0">
+                <a:hlinkClick r:id="rId4"/>
+              </a:rPr>
+              <a:t>http://lindell.me/JsBarcode/</a:t>
+            </a:r>
+            <a:endParaRPr lang="en-US" sz="1200" dirty="0"/>
+          </a:p>
+          <a:p>
+            <a:endParaRPr lang="en-US" dirty="0"/>
+          </a:p>
+        </p:txBody>
+      </p:sp>
+      <p:sp>
+        <p:nvSpPr>
+          <p:cNvPr id="4" name="Slide Number Placeholder 3"/>
+          <p:cNvSpPr>
+            <a:spLocks noGrp="1"/>
+          </p:cNvSpPr>
+          <p:nvPr>
+            <p:ph type="sldNum" sz="quarter" idx="10"/>
+          </p:nvPr>
+        </p:nvSpPr>
+        <p:spPr/>
+        <p:txBody>
+          <a:bodyPr/>
+          <a:lstStyle/>
+          <a:p>
+            <a:fld id="{32674CE4-FBD8-4481-AEFB-CA53E599A745}" type="slidenum">
+              <a:rPr lang="en-US" smtClean="0"/>
+              <a:t>6</a:t>
+            </a:fld>
+            <a:endParaRPr lang="en-US"/>
+          </a:p>
+        </p:txBody>
+      </p:sp>
+    </p:spTree>
+    <p:extLst>
+      <p:ext uri="{BB962C8B-B14F-4D97-AF65-F5344CB8AC3E}">
+        <p14:creationId xmlns:p14="http://schemas.microsoft.com/office/powerpoint/2010/main" val="2833825629"/>
       </p:ext>
     </p:extLst>
   </p:cSld>
@@ -5080,6 +5220,75 @@
 </p:sld>
 </file>
 
+<file path=ppt/slides/slide10.xml><?xml version="1.0" encoding="utf-8"?>
+<p:sld xmlns:a="http://schemas.openxmlformats.org/drawingml/2006/main" xmlns:r="http://schemas.openxmlformats.org/officeDocument/2006/relationships" xmlns:p="http://schemas.openxmlformats.org/presentationml/2006/main">
+  <p:cSld>
+    <p:spTree>
+      <p:nvGrpSpPr>
+        <p:cNvPr id="1" name=""/>
+        <p:cNvGrpSpPr/>
+        <p:nvPr/>
+      </p:nvGrpSpPr>
+      <p:grpSpPr>
+        <a:xfrm>
+          <a:off x="0" y="0"/>
+          <a:ext cx="0" cy="0"/>
+          <a:chOff x="0" y="0"/>
+          <a:chExt cx="0" cy="0"/>
+        </a:xfrm>
+      </p:grpSpPr>
+      <p:sp>
+        <p:nvSpPr>
+          <p:cNvPr id="107522" name="Rectangle 2"/>
+          <p:cNvSpPr>
+            <a:spLocks noGrp="1" noChangeArrowheads="1"/>
+          </p:cNvSpPr>
+          <p:nvPr>
+            <p:ph type="title"/>
+          </p:nvPr>
+        </p:nvSpPr>
+        <p:spPr>
+          <a:xfrm>
+            <a:off x="397818" y="4824153"/>
+            <a:ext cx="8646429" cy="1362075"/>
+          </a:xfrm>
+        </p:spPr>
+        <p:txBody>
+          <a:bodyPr/>
+          <a:lstStyle/>
+          <a:p>
+            <a:r>
+              <a:rPr lang="en-US" sz="7200" dirty="0"/>
+              <a:t>Questions and Answers</a:t>
+            </a:r>
+          </a:p>
+        </p:txBody>
+      </p:sp>
+    </p:spTree>
+    <p:extLst>
+      <p:ext uri="{BB962C8B-B14F-4D97-AF65-F5344CB8AC3E}">
+        <p14:creationId xmlns:p14="http://schemas.microsoft.com/office/powerpoint/2010/main" val="2494420292"/>
+      </p:ext>
+    </p:extLst>
+  </p:cSld>
+  <p:clrMapOvr>
+    <a:masterClrMapping/>
+  </p:clrMapOvr>
+  <mc:AlternateContent xmlns:mc="http://schemas.openxmlformats.org/markup-compatibility/2006" xmlns:p14="http://schemas.microsoft.com/office/powerpoint/2010/main">
+    <mc:Choice Requires="p14">
+      <p:transition spd="med" p14:dur="700">
+        <p:fade/>
+      </p:transition>
+    </mc:Choice>
+    <mc:Fallback xmlns="">
+      <p:transition spd="med">
+        <p:fade/>
+      </p:transition>
+    </mc:Fallback>
+  </mc:AlternateContent>
+</p:sld>
+</file>
+
 <file path=ppt/slides/slide2.xml><?xml version="1.0" encoding="utf-8"?>
 <p:sld xmlns:a="http://schemas.openxmlformats.org/drawingml/2006/main" xmlns:r="http://schemas.openxmlformats.org/officeDocument/2006/relationships" xmlns:p="http://schemas.openxmlformats.org/presentationml/2006/main">
   <p:cSld>
@@ -5569,7 +5778,7 @@
         </p:spPr>
         <p:txBody>
           <a:bodyPr>
-            <a:normAutofit lnSpcReduction="10000"/>
+            <a:normAutofit/>
           </a:bodyPr>
           <a:lstStyle/>
           <a:p>
@@ -5592,32 +5801,9 @@
             </a:r>
           </a:p>
           <a:p>
-            <a:pPr lvl="1"/>
-            <a:r>
-              <a:rPr lang="en-US" sz="3600" dirty="0">
-                <a:hlinkClick r:id="rId2"/>
-              </a:rPr>
-              <a:t>http://lindell.me/JsBarcode/</a:t>
-            </a:r>
-            <a:endParaRPr lang="en-US" sz="3600" dirty="0"/>
-          </a:p>
-          <a:p>
             <a:r>
               <a:rPr lang="en-US" sz="3700" dirty="0"/>
               <a:t>Materialize CSS</a:t>
-            </a:r>
-          </a:p>
-          <a:p>
-            <a:pPr lvl="1"/>
-            <a:r>
-              <a:rPr lang="en-US" sz="3600" dirty="0">
-                <a:hlinkClick r:id="rId3"/>
-              </a:rPr>
-              <a:t>http://materializecss.com/</a:t>
-            </a:r>
-            <a:r>
-              <a:rPr lang="en-US" sz="3600" dirty="0"/>
-              <a:t> </a:t>
             </a:r>
           </a:p>
           <a:p>
@@ -5902,8 +6088,8 @@
         </p:nvSpPr>
         <p:spPr>
           <a:xfrm>
-            <a:off x="609600" y="2249425"/>
-            <a:ext cx="10871200" cy="4341875"/>
+            <a:off x="609599" y="1760913"/>
+            <a:ext cx="5367253" cy="4830387"/>
           </a:xfrm>
         </p:spPr>
         <p:txBody>
@@ -5912,28 +6098,7 @@
           </a:bodyPr>
           <a:lstStyle/>
           <a:p>
-            <a:r>
-              <a:rPr lang="en-US" sz="3600" dirty="0"/>
-              <a:t>Collaborating via Zoom and Skype</a:t>
-            </a:r>
-          </a:p>
-          <a:p>
-            <a:r>
-              <a:rPr lang="en-US" sz="3600" dirty="0"/>
-              <a:t>Trello</a:t>
-            </a:r>
-          </a:p>
-          <a:p>
-            <a:r>
-              <a:rPr lang="en-US" sz="3600" dirty="0"/>
-              <a:t>Slack</a:t>
-            </a:r>
-          </a:p>
-          <a:p>
-            <a:r>
-              <a:rPr lang="en-US" sz="3600" dirty="0"/>
-              <a:t>Open lab in GRF </a:t>
-            </a:r>
+            <a:endParaRPr lang="en-US" sz="3500" dirty="0"/>
           </a:p>
         </p:txBody>
       </p:sp>
@@ -5961,15 +6126,41 @@
           <a:p>
             <a:r>
               <a:rPr lang="en-US" sz="8000" dirty="0"/>
-              <a:t>Teamwork</a:t>
-            </a:r>
+              <a:t>Timeline</a:t>
+            </a:r>
+          </a:p>
+        </p:txBody>
+      </p:sp>
+      <p:sp>
+        <p:nvSpPr>
+          <p:cNvPr id="5" name="Content Placeholder 2"/>
+          <p:cNvSpPr>
+            <a:spLocks noGrp="1"/>
+          </p:cNvSpPr>
+          <p:nvPr>
+            <p:ph sz="half" idx="1"/>
+          </p:nvPr>
+        </p:nvSpPr>
+        <p:spPr>
+          <a:xfrm>
+            <a:off x="6215149" y="1760913"/>
+            <a:ext cx="5384800" cy="4830387"/>
+          </a:xfrm>
+        </p:spPr>
+        <p:txBody>
+          <a:bodyPr>
+            <a:normAutofit/>
+          </a:bodyPr>
+          <a:lstStyle/>
+          <a:p>
+            <a:endParaRPr lang="en-US" sz="3500" dirty="0"/>
           </a:p>
         </p:txBody>
       </p:sp>
     </p:spTree>
     <p:extLst>
       <p:ext uri="{BB962C8B-B14F-4D97-AF65-F5344CB8AC3E}">
-        <p14:creationId xmlns:p14="http://schemas.microsoft.com/office/powerpoint/2010/main" val="378640935"/>
+        <p14:creationId xmlns:p14="http://schemas.microsoft.com/office/powerpoint/2010/main" val="3998631603"/>
       </p:ext>
     </p:extLst>
   </p:cSld>
@@ -6010,9 +6201,56 @@
       </p:grpSpPr>
       <p:sp>
         <p:nvSpPr>
-          <p:cNvPr id="107522" name="Rectangle 2"/>
-          <p:cNvSpPr>
-            <a:spLocks noGrp="1" noChangeArrowheads="1"/>
+          <p:cNvPr id="3" name="Content Placeholder 2"/>
+          <p:cNvSpPr>
+            <a:spLocks noGrp="1"/>
+          </p:cNvSpPr>
+          <p:nvPr>
+            <p:ph sz="half" idx="1"/>
+          </p:nvPr>
+        </p:nvSpPr>
+        <p:spPr>
+          <a:xfrm>
+            <a:off x="609600" y="2249425"/>
+            <a:ext cx="10871200" cy="4341875"/>
+          </a:xfrm>
+        </p:spPr>
+        <p:txBody>
+          <a:bodyPr>
+            <a:normAutofit/>
+          </a:bodyPr>
+          <a:lstStyle/>
+          <a:p>
+            <a:r>
+              <a:rPr lang="en-US" sz="3600" dirty="0"/>
+              <a:t>Collaborating via Zoom and Skype</a:t>
+            </a:r>
+          </a:p>
+          <a:p>
+            <a:r>
+              <a:rPr lang="en-US" sz="3600" dirty="0"/>
+              <a:t>Trello</a:t>
+            </a:r>
+          </a:p>
+          <a:p>
+            <a:r>
+              <a:rPr lang="en-US" sz="3600" dirty="0"/>
+              <a:t>Slack</a:t>
+            </a:r>
+          </a:p>
+          <a:p>
+            <a:r>
+              <a:rPr lang="en-US" sz="3600" dirty="0"/>
+              <a:t>Open lab in GRF </a:t>
+            </a:r>
+          </a:p>
+        </p:txBody>
+      </p:sp>
+      <p:sp>
+        <p:nvSpPr>
+          <p:cNvPr id="4" name="Title 3"/>
+          <p:cNvSpPr>
+            <a:spLocks noGrp="1"/>
           </p:cNvSpPr>
           <p:nvPr>
             <p:ph type="title"/>
@@ -6020,17 +6258,19 @@
         </p:nvSpPr>
         <p:spPr>
           <a:xfrm>
-            <a:off x="397818" y="4824153"/>
-            <a:ext cx="8646429" cy="1362075"/>
-          </a:xfrm>
-        </p:spPr>
-        <p:txBody>
-          <a:bodyPr/>
-          <a:lstStyle/>
-          <a:p>
-            <a:r>
-              <a:rPr lang="en-US" sz="7200" dirty="0"/>
-              <a:t>Questions and Answers</a:t>
+            <a:off x="508000" y="694113"/>
+            <a:ext cx="10972800" cy="1066800"/>
+          </a:xfrm>
+        </p:spPr>
+        <p:txBody>
+          <a:bodyPr>
+            <a:noAutofit/>
+          </a:bodyPr>
+          <a:lstStyle/>
+          <a:p>
+            <a:r>
+              <a:rPr lang="en-US" sz="8000" dirty="0"/>
+              <a:t>Teamwork</a:t>
             </a:r>
           </a:p>
         </p:txBody>
@@ -6038,7 +6278,7 @@
     </p:spTree>
     <p:extLst>
       <p:ext uri="{BB962C8B-B14F-4D97-AF65-F5344CB8AC3E}">
-        <p14:creationId xmlns:p14="http://schemas.microsoft.com/office/powerpoint/2010/main" val="2494420292"/>
+        <p14:creationId xmlns:p14="http://schemas.microsoft.com/office/powerpoint/2010/main" val="378640935"/>
       </p:ext>
     </p:extLst>
   </p:cSld>

</xml_diff>